<commit_message>
Presentation 15 minor changes
Presentation 15 minor changes
</commit_message>
<xml_diff>
--- a/15/presentations/asociacne_pravidla.pptx
+++ b/15/presentations/asociacne_pravidla.pptx
@@ -218,7 +218,7 @@
           <a:p>
             <a:fld id="{7D261E44-C4C0-6344-AB31-495F47CEF0BF}" type="datetimeFigureOut">
               <a:rPr lang="sk-SK" smtClean="0"/>
-              <a:t>23.4.19</a:t>
+              <a:t>19. 12. 2019</a:t>
             </a:fld>
             <a:endParaRPr lang="sk-SK"/>
           </a:p>
@@ -617,7 +617,7 @@
           <a:p>
             <a:fld id="{A066C677-8E45-E141-9716-C86D7EE5D9E8}" type="datetime1">
               <a:rPr lang="sk-SK" smtClean="0"/>
-              <a:t>23.4.19</a:t>
+              <a:t>19. 12. 2019</a:t>
             </a:fld>
             <a:endParaRPr lang="en-US"/>
           </a:p>
@@ -787,7 +787,7 @@
           <a:p>
             <a:fld id="{2F1614C0-FE52-F449-9EB9-A0FF9A2543CD}" type="datetime1">
               <a:rPr lang="sk-SK" smtClean="0"/>
-              <a:t>23.4.19</a:t>
+              <a:t>19. 12. 2019</a:t>
             </a:fld>
             <a:endParaRPr lang="en-US"/>
           </a:p>
@@ -967,7 +967,7 @@
           <a:p>
             <a:fld id="{D00EA2FD-E00D-9848-8434-0267DBC70800}" type="datetime1">
               <a:rPr lang="sk-SK" smtClean="0"/>
-              <a:t>23.4.19</a:t>
+              <a:t>19. 12. 2019</a:t>
             </a:fld>
             <a:endParaRPr lang="en-US"/>
           </a:p>
@@ -1137,7 +1137,7 @@
           <a:p>
             <a:fld id="{EA230261-6B22-9D46-9363-FF39813EB6EC}" type="datetime1">
               <a:rPr lang="sk-SK" smtClean="0"/>
-              <a:t>23.4.19</a:t>
+              <a:t>19. 12. 2019</a:t>
             </a:fld>
             <a:endParaRPr lang="en-US"/>
           </a:p>
@@ -1381,7 +1381,7 @@
           <a:p>
             <a:fld id="{59FB9737-2E3E-7648-A62E-672F14D45174}" type="datetime1">
               <a:rPr lang="sk-SK" smtClean="0"/>
-              <a:t>23.4.19</a:t>
+              <a:t>19. 12. 2019</a:t>
             </a:fld>
             <a:endParaRPr lang="en-US"/>
           </a:p>
@@ -1613,7 +1613,7 @@
           <a:p>
             <a:fld id="{CE392BCD-50BB-5C4E-9FA2-1520C47BA1A9}" type="datetime1">
               <a:rPr lang="sk-SK" smtClean="0"/>
-              <a:t>23.4.19</a:t>
+              <a:t>19. 12. 2019</a:t>
             </a:fld>
             <a:endParaRPr lang="en-US"/>
           </a:p>
@@ -1980,7 +1980,7 @@
           <a:p>
             <a:fld id="{47588235-1A3D-8F40-84C0-D3E6FA642448}" type="datetime1">
               <a:rPr lang="sk-SK" smtClean="0"/>
-              <a:t>23.4.19</a:t>
+              <a:t>19. 12. 2019</a:t>
             </a:fld>
             <a:endParaRPr lang="en-US"/>
           </a:p>
@@ -2098,7 +2098,7 @@
           <a:p>
             <a:fld id="{C41B8640-B450-0C4A-9516-6E2711D4D46C}" type="datetime1">
               <a:rPr lang="sk-SK" smtClean="0"/>
-              <a:t>23.4.19</a:t>
+              <a:t>19. 12. 2019</a:t>
             </a:fld>
             <a:endParaRPr lang="en-US"/>
           </a:p>
@@ -2193,7 +2193,7 @@
           <a:p>
             <a:fld id="{6B0C531D-6297-E049-BA84-34FE8FD92947}" type="datetime1">
               <a:rPr lang="sk-SK" smtClean="0"/>
-              <a:t>23.4.19</a:t>
+              <a:t>19. 12. 2019</a:t>
             </a:fld>
             <a:endParaRPr lang="en-US"/>
           </a:p>
@@ -2470,7 +2470,7 @@
           <a:p>
             <a:fld id="{5410C6F4-3FBB-2D4D-B13A-D6953AE0A3AF}" type="datetime1">
               <a:rPr lang="sk-SK" smtClean="0"/>
-              <a:t>23.4.19</a:t>
+              <a:t>19. 12. 2019</a:t>
             </a:fld>
             <a:endParaRPr lang="en-US"/>
           </a:p>
@@ -2727,7 +2727,7 @@
           <a:p>
             <a:fld id="{637C8A6D-C806-FE45-AB4E-63619D22D102}" type="datetime1">
               <a:rPr lang="sk-SK" smtClean="0"/>
-              <a:t>23.4.19</a:t>
+              <a:t>19. 12. 2019</a:t>
             </a:fld>
             <a:endParaRPr lang="en-US"/>
           </a:p>
@@ -2940,7 +2940,7 @@
           <a:p>
             <a:fld id="{5F80EA03-2C13-2441-AAFA-2B3D759DC539}" type="datetime1">
               <a:rPr lang="sk-SK" smtClean="0"/>
-              <a:t>23.4.19</a:t>
+              <a:t>19. 12. 2019</a:t>
             </a:fld>
             <a:endParaRPr lang="en-US"/>
           </a:p>
@@ -4130,11 +4130,11 @@
             </a:r>
             <a:r>
               <a:rPr lang="sk-SK" dirty="0" err="1"/>
-              <a:t>korelácii</a:t>
-            </a:r>
-            <a:r>
-              <a:rPr lang="sk-SK" dirty="0"/>
-              <a:t>́ alebo </a:t>
+              <a:t>korelácií</a:t>
+            </a:r>
+            <a:r>
+              <a:rPr lang="sk-SK" dirty="0"/>
+              <a:t> alebo </a:t>
             </a:r>
             <a:r>
               <a:rPr lang="sk-SK" dirty="0" err="1"/>
@@ -4823,15 +4823,23 @@
             </a:r>
             <a:r>
               <a:rPr lang="sk-SK" dirty="0"/>
-              <a:t>”) -&gt; kupuje(x, “pivo”) [0.5%, 60%] – </a:t>
-            </a:r>
-            <a:r>
-              <a:rPr lang="sk-SK" dirty="0" err="1"/>
-              <a:t>resp.jednoduchšie:pampersky</a:t>
-            </a:r>
-            <a:r>
-              <a:rPr lang="sk-SK" dirty="0"/>
-              <a:t> -&gt; pivo[0.5%,60%] </a:t>
+              <a:t>”) -&gt; kupuje(x, “pivo”) resp. </a:t>
+            </a:r>
+            <a:r>
+              <a:rPr lang="sk-SK" dirty="0" err="1"/>
+              <a:t>jednoduchšie</a:t>
+            </a:r>
+            <a:r>
+              <a:rPr lang="sk-SK" dirty="0"/>
+              <a:t>: </a:t>
+            </a:r>
+            <a:r>
+              <a:rPr lang="sk-SK" dirty="0" err="1"/>
+              <a:t>pampersky</a:t>
+            </a:r>
+            <a:r>
+              <a:rPr lang="sk-SK" dirty="0"/>
+              <a:t> -&gt; pivo</a:t>
             </a:r>
           </a:p>
           <a:p>
@@ -5638,8 +5646,12 @@
           </a:p>
           <a:p>
             <a:r>
-              <a:rPr lang="sk-SK" dirty="0"/>
-              <a:t>Podpora - </a:t>
+              <a:rPr lang="sk-SK" b="1" dirty="0"/>
+              <a:t>Podpora</a:t>
+            </a:r>
+            <a:r>
+              <a:rPr lang="sk-SK" dirty="0"/>
+              <a:t> - </a:t>
             </a:r>
             <a:r>
               <a:rPr lang="sk-SK" dirty="0" err="1"/>
@@ -5665,12 +5677,12 @@
           </a:p>
           <a:p>
             <a:r>
-              <a:rPr lang="sk-SK" dirty="0" err="1"/>
-              <a:t>Spoľahlivost</a:t>
-            </a:r>
-            <a:r>
-              <a:rPr lang="sk-SK" dirty="0"/>
-              <a:t>̌ - </a:t>
+              <a:rPr lang="sk-SK" b="1" dirty="0"/>
+              <a:t>Spoľahlivosť</a:t>
+            </a:r>
+            <a:r>
+              <a:rPr lang="sk-SK" dirty="0"/>
+              <a:t>- </a:t>
             </a:r>
             <a:r>
               <a:rPr lang="sk-SK" dirty="0" err="1"/>
@@ -6258,6 +6270,7 @@
             <a:endParaRPr lang="sk-SK" sz="1400" dirty="0"/>
           </a:p>
           <a:p>
+            <a:pPr lvl="1"/>
             <a:r>
               <a:rPr lang="sk-SK" dirty="0"/>
               <a:t>V prvej </a:t>
@@ -6320,6 +6333,7 @@
             </a:r>
           </a:p>
           <a:p>
+            <a:pPr lvl="1"/>
             <a:r>
               <a:rPr lang="sk-SK" dirty="0"/>
               <a:t>V druhej </a:t>
@@ -6394,7 +6408,11 @@
             </a:r>
             <a:r>
               <a:rPr lang="sk-SK" dirty="0"/>
-              <a:t>́ podmienku </a:t>
+              <a:t>́ </a:t>
+            </a:r>
+            <a:r>
+              <a:rPr lang="sk-SK"/>
+              <a:t>podmienku napr. </a:t>
             </a:r>
             <a:r>
               <a:rPr lang="sk-SK" dirty="0" err="1"/>

</xml_diff>